<commit_message>
bug fix: renamed wrongly named file
</commit_message>
<xml_diff>
--- a/Presentation-Slides-CSharp-EN/Chapter-1-Into-Programming/02.Computer-Programs.pptx
+++ b/Presentation-Slides-CSharp-EN/Chapter-1-Into-Programming/02.Computer-Programs.pptx
@@ -232,7 +232,7 @@
             <a:fld id="{FE5B4EDC-59C0-49C7-8ADA-5A781B329E02}" type="datetimeFigureOut">
               <a:rPr lang="en-US"/>
               <a:pPr/>
-              <a:t>11-Feb-19</a:t>
+              <a:t>18-Feb-19</a:t>
             </a:fld>
             <a:endParaRPr dirty="0"/>
           </a:p>
@@ -431,7 +431,7 @@
             <a:fld id="{F2D8D46A-B586-417D-BFBD-8C8FE0AAF762}" type="datetimeFigureOut">
               <a:rPr lang="en-US" smtClean="0"/>
               <a:pPr/>
-              <a:t>11-Feb-19</a:t>
+              <a:t>18-Feb-19</a:t>
             </a:fld>
             <a:endParaRPr lang="en-US"/>
           </a:p>
@@ -1855,7 +1855,7 @@
             <a:fld id="{055373AC-9AA7-423B-BA00-BA1C74164DBD}" type="datetime1">
               <a:rPr lang="en-US" smtClean="0"/>
               <a:pPr/>
-              <a:t>11-Feb-19</a:t>
+              <a:t>18-Feb-19</a:t>
             </a:fld>
             <a:endParaRPr lang="en-US" dirty="0"/>
           </a:p>
@@ -2386,7 +2386,7 @@
             <a:fld id="{055373AC-9AA7-423B-BA00-BA1C74164DBD}" type="datetime1">
               <a:rPr lang="en-US" smtClean="0"/>
               <a:pPr/>
-              <a:t>11-Feb-19</a:t>
+              <a:t>18-Feb-19</a:t>
             </a:fld>
             <a:endParaRPr lang="en-US" dirty="0"/>
           </a:p>
@@ -2960,8 +2960,8 @@
         </p:nvSpPr>
         <p:spPr>
           <a:xfrm>
-            <a:off x="1446212" y="4689455"/>
-            <a:ext cx="8938472" cy="1734697"/>
+            <a:off x="783484" y="5116100"/>
+            <a:ext cx="10263928" cy="903700"/>
           </a:xfrm>
         </p:spPr>
         <p:txBody>
@@ -2975,14 +2975,7 @@
             </a:pPr>
             <a:r>
               <a:rPr lang="en-US" dirty="0"/>
-              <a:t>What Does It Mean</a:t>
-            </a:r>
-            <a:br>
-              <a:rPr lang="en-US" dirty="0"/>
-            </a:br>
-            <a:r>
-              <a:rPr lang="en-US" dirty="0"/>
-              <a:t>"To Program"?</a:t>
+              <a:t>Computer Programs – Concepts</a:t>
             </a:r>
           </a:p>
         </p:txBody>
@@ -3003,7 +2996,7 @@
         </p:blipFill>
         <p:spPr>
           <a:xfrm>
-            <a:off x="4445792" y="1237371"/>
+            <a:off x="4445792" y="1487371"/>
             <a:ext cx="2912418" cy="3006255"/>
           </a:xfrm>
           <a:prstGeom prst="rect">
@@ -3034,7 +3027,7 @@
         </p:blipFill>
         <p:spPr bwMode="auto">
           <a:xfrm>
-            <a:off x="594565" y="1150314"/>
+            <a:off x="594565" y="1400314"/>
             <a:ext cx="3577914" cy="3180368"/>
           </a:xfrm>
           <a:prstGeom prst="ellipse">
@@ -3078,7 +3071,7 @@
         </p:blipFill>
         <p:spPr bwMode="auto">
           <a:xfrm>
-            <a:off x="7717902" y="2044682"/>
+            <a:off x="7717902" y="2294682"/>
             <a:ext cx="3790950" cy="2132738"/>
           </a:xfrm>
           <a:prstGeom prst="rect">
@@ -3275,14 +3268,28 @@
             <a:endParaRPr lang="en-US" dirty="0"/>
           </a:p>
           <a:p>
-            <a:pPr lvl="2">
+            <a:pPr lvl="1">
               <a:lnSpc>
                 <a:spcPct val="100000"/>
               </a:lnSpc>
             </a:pPr>
             <a:r>
               <a:rPr lang="en-US" dirty="0"/>
-              <a:t>A computer program is a sequence of commands</a:t>
+              <a:t>A </a:t>
+            </a:r>
+            <a:r>
+              <a:rPr lang="en-US" dirty="0">
+                <a:solidFill>
+                  <a:schemeClr val="tx2">
+                    <a:lumMod val="75000"/>
+                  </a:schemeClr>
+                </a:solidFill>
+              </a:rPr>
+              <a:t>computer program </a:t>
+            </a:r>
+            <a:r>
+              <a:rPr lang="en-US" dirty="0"/>
+              <a:t>is a sequence of commands</a:t>
             </a:r>
           </a:p>
           <a:p>
@@ -3629,15 +3636,33 @@
                                   </p:childTnLst>
                                 </p:cTn>
                               </p:par>
+                            </p:childTnLst>
+                          </p:cTn>
+                        </p:par>
+                      </p:childTnLst>
+                    </p:cTn>
+                  </p:par>
+                  <p:par>
+                    <p:cTn id="9" fill="hold">
+                      <p:stCondLst>
+                        <p:cond delay="indefinite"/>
+                      </p:stCondLst>
+                      <p:childTnLst>
+                        <p:par>
+                          <p:cTn id="10" fill="hold">
+                            <p:stCondLst>
+                              <p:cond delay="0"/>
+                            </p:stCondLst>
+                            <p:childTnLst>
                               <p:par>
-                                <p:cTn id="9" presetID="1" presetClass="entr" presetSubtype="0" fill="hold" nodeType="withEffect">
+                                <p:cTn id="11" presetID="1" presetClass="entr" presetSubtype="0" fill="hold" nodeType="clickEffect">
                                   <p:stCondLst>
                                     <p:cond delay="0"/>
                                   </p:stCondLst>
                                   <p:childTnLst>
                                     <p:set>
                                       <p:cBhvr>
-                                        <p:cTn id="10" dur="1" fill="hold">
+                                        <p:cTn id="12" dur="1" fill="hold">
                                           <p:stCondLst>
                                             <p:cond delay="0"/>
                                           </p:stCondLst>
@@ -3661,14 +3686,14 @@
                                 </p:cTn>
                               </p:par>
                               <p:par>
-                                <p:cTn id="11" presetID="1" presetClass="entr" presetSubtype="0" fill="hold" nodeType="withEffect">
+                                <p:cTn id="13" presetID="1" presetClass="entr" presetSubtype="0" fill="hold" nodeType="withEffect">
                                   <p:stCondLst>
                                     <p:cond delay="0"/>
                                   </p:stCondLst>
                                   <p:childTnLst>
                                     <p:set>
                                       <p:cBhvr>
-                                        <p:cTn id="12" dur="1" fill="hold">
+                                        <p:cTn id="14" dur="1" fill="hold">
                                           <p:stCondLst>
                                             <p:cond delay="0"/>
                                           </p:stCondLst>
@@ -3698,26 +3723,26 @@
                     </p:cTn>
                   </p:par>
                   <p:par>
-                    <p:cTn id="13" fill="hold">
+                    <p:cTn id="15" fill="hold">
                       <p:stCondLst>
                         <p:cond delay="indefinite"/>
                       </p:stCondLst>
                       <p:childTnLst>
                         <p:par>
-                          <p:cTn id="14" fill="hold">
+                          <p:cTn id="16" fill="hold">
                             <p:stCondLst>
                               <p:cond delay="0"/>
                             </p:stCondLst>
                             <p:childTnLst>
                               <p:par>
-                                <p:cTn id="15" presetID="1" presetClass="entr" presetSubtype="0" fill="hold" nodeType="clickEffect">
+                                <p:cTn id="17" presetID="1" presetClass="entr" presetSubtype="0" fill="hold" nodeType="clickEffect">
                                   <p:stCondLst>
                                     <p:cond delay="0"/>
                                   </p:stCondLst>
                                   <p:childTnLst>
                                     <p:set>
                                       <p:cBhvr>
-                                        <p:cTn id="16" dur="1" fill="hold">
+                                        <p:cTn id="18" dur="1" fill="hold">
                                           <p:stCondLst>
                                             <p:cond delay="0"/>
                                           </p:stCondLst>
@@ -3741,14 +3766,14 @@
                                 </p:cTn>
                               </p:par>
                               <p:par>
-                                <p:cTn id="17" presetID="1" presetClass="entr" presetSubtype="0" fill="hold" nodeType="withEffect">
+                                <p:cTn id="19" presetID="1" presetClass="entr" presetSubtype="0" fill="hold" nodeType="withEffect">
                                   <p:stCondLst>
                                     <p:cond delay="0"/>
                                   </p:stCondLst>
                                   <p:childTnLst>
                                     <p:set>
                                       <p:cBhvr>
-                                        <p:cTn id="18" dur="1" fill="hold">
+                                        <p:cTn id="20" dur="1" fill="hold">
                                           <p:stCondLst>
                                             <p:cond delay="0"/>
                                           </p:stCondLst>
@@ -4143,6 +4168,36 @@
           </a:p>
         </p:txBody>
       </p:sp>
+      <p:pic>
+        <p:nvPicPr>
+          <p:cNvPr id="3" name="Picture 2">
+            <a:extLst>
+              <a:ext uri="{FF2B5EF4-FFF2-40B4-BE49-F238E27FC236}">
+                <a16:creationId xmlns:a16="http://schemas.microsoft.com/office/drawing/2014/main" id="{58E74ADD-E6F1-4402-B866-509FE553C66E}"/>
+              </a:ext>
+            </a:extLst>
+          </p:cNvPr>
+          <p:cNvPicPr>
+            <a:picLocks noChangeAspect="1"/>
+          </p:cNvPicPr>
+          <p:nvPr/>
+        </p:nvPicPr>
+        <p:blipFill>
+          <a:blip r:embed="rId3"/>
+          <a:stretch>
+            <a:fillRect/>
+          </a:stretch>
+        </p:blipFill>
+        <p:spPr>
+          <a:xfrm>
+            <a:off x="2513012" y="4343400"/>
+            <a:ext cx="8010525" cy="1866900"/>
+          </a:xfrm>
+          <a:prstGeom prst="rect">
+            <a:avLst/>
+          </a:prstGeom>
+        </p:spPr>
+      </p:pic>
     </p:spTree>
     <p:extLst>
       <p:ext uri="{BB962C8B-B14F-4D97-AF65-F5344CB8AC3E}">
@@ -5285,7 +5340,7 @@
             </a:pPr>
             <a:r>
               <a:rPr lang="en-US" dirty="0"/>
-              <a:t>During compilation, it finds syntax errors in the code</a:t>
+              <a:t>During the compilation, it finds syntax errors in the code</a:t>
             </a:r>
           </a:p>
           <a:p>

</xml_diff>